<commit_message>
Light background dark font easier to read on projector
</commit_message>
<xml_diff>
--- a/git.pptx
+++ b/git.pptx
@@ -125,6 +125,9 @@
   <p:extLst>
     <p:ext uri="{EFAFB233-063F-42B5-8137-9DF3F51BA10A}">
       <p15:sldGuideLst xmlns:p15="http://schemas.microsoft.com/office/powerpoint/2012/main"/>
+    </p:ext>
+    <p:ext uri="{2D200454-40CA-4A62-9FC3-DE9A4176ACB9}">
+      <p15:notesGuideLst xmlns:p15="http://schemas.microsoft.com/office/powerpoint/2012/main"/>
     </p:ext>
   </p:extLst>
 </p:presentation>
@@ -17031,8 +17034,29 @@
                   <a:schemeClr val="tx1"/>
                 </a:solidFill>
               </a:rPr>
-              <a:t>Computer turned off</a:t>
-            </a:r>
+              <a:t>Computer </a:t>
+            </a:r>
+            <a:r>
+              <a:rPr lang="en-US" sz="2400">
+                <a:solidFill>
+                  <a:schemeClr val="tx1"/>
+                </a:solidFill>
+              </a:rPr>
+              <a:t>turned </a:t>
+            </a:r>
+            <a:r>
+              <a:rPr lang="en-US" sz="2400" smtClean="0">
+                <a:solidFill>
+                  <a:schemeClr val="tx1"/>
+                </a:solidFill>
+              </a:rPr>
+              <a:t>off</a:t>
+            </a:r>
+            <a:endParaRPr lang="en-US" sz="2400" dirty="0">
+              <a:solidFill>
+                <a:schemeClr val="tx1"/>
+              </a:solidFill>
+            </a:endParaRPr>
           </a:p>
           <a:p>
             <a:pPr marL="378000" lvl="0">
@@ -17541,15 +17565,7 @@
                 <a:ea typeface="Microsoft YaHei" pitchFamily="2"/>
                 <a:cs typeface="Mangal" pitchFamily="2"/>
               </a:rPr>
-              <a:t>tried to add a major feature but it is not going to work.  </a:t>
-            </a:r>
-            <a:r>
-              <a:rPr lang="en-US" sz="2400" dirty="0">
-                <a:latin typeface="Calibri" pitchFamily="18"/>
-                <a:ea typeface="Microsoft YaHei" pitchFamily="2"/>
-                <a:cs typeface="Mangal" pitchFamily="2"/>
-              </a:rPr>
-              <a:t>How can we ALL get back to where the code was two weeks ago?</a:t>
+              <a:t>tried to add a major feature but it is not going to work.  How can we ALL get back to where the code was two weeks ago?</a:t>
             </a:r>
           </a:p>
         </p:txBody>

</xml_diff>

<commit_message>
Update GitTest presentation for team 4913
</commit_message>
<xml_diff>
--- a/git.pptx
+++ b/git.pptx
@@ -2446,7 +2446,7 @@
             <a:fld id="{F419F0EB-BCE3-4FC1-8CC7-D5D2DD01CF44}" type="datetime1">
               <a:rPr lang="en-US" smtClean="0"/>
               <a:pPr lvl="0"/>
-              <a:t>11/5/2016</a:t>
+              <a:t>10/1/2017</a:t>
             </a:fld>
             <a:endParaRPr lang="en-US"/>
           </a:p>
@@ -2627,7 +2627,7 @@
             <a:fld id="{F419F0EB-BCE3-4FC1-8CC7-D5D2DD01CF44}" type="datetime1">
               <a:rPr lang="en-US" smtClean="0"/>
               <a:pPr lvl="0"/>
-              <a:t>11/5/2016</a:t>
+              <a:t>10/1/2017</a:t>
             </a:fld>
             <a:endParaRPr lang="en-US"/>
           </a:p>
@@ -2818,7 +2818,7 @@
             <a:fld id="{F419F0EB-BCE3-4FC1-8CC7-D5D2DD01CF44}" type="datetime1">
               <a:rPr lang="en-US" smtClean="0"/>
               <a:pPr lvl="0"/>
-              <a:t>11/5/2016</a:t>
+              <a:t>10/1/2017</a:t>
             </a:fld>
             <a:endParaRPr lang="en-US"/>
           </a:p>
@@ -3021,7 +3021,7 @@
             <a:fld id="{5A14DE2F-99D9-4C9A-873C-DD21F3849A08}" type="datetime1">
               <a:rPr lang="en-US" smtClean="0"/>
               <a:pPr lvl="0"/>
-              <a:t>11/5/2016</a:t>
+              <a:t>10/1/2017</a:t>
             </a:fld>
             <a:endParaRPr lang="en-US"/>
           </a:p>
@@ -3202,7 +3202,7 @@
             <a:fld id="{5A14DE2F-99D9-4C9A-873C-DD21F3849A08}" type="datetime1">
               <a:rPr lang="en-US" smtClean="0"/>
               <a:pPr lvl="0"/>
-              <a:t>11/5/2016</a:t>
+              <a:t>10/1/2017</a:t>
             </a:fld>
             <a:endParaRPr lang="en-US"/>
           </a:p>
@@ -3459,7 +3459,7 @@
             <a:fld id="{5A14DE2F-99D9-4C9A-873C-DD21F3849A08}" type="datetime1">
               <a:rPr lang="en-US" smtClean="0"/>
               <a:pPr lvl="0"/>
-              <a:t>11/5/2016</a:t>
+              <a:t>10/1/2017</a:t>
             </a:fld>
             <a:endParaRPr lang="en-US"/>
           </a:p>
@@ -3702,7 +3702,7 @@
             <a:fld id="{5A14DE2F-99D9-4C9A-873C-DD21F3849A08}" type="datetime1">
               <a:rPr lang="en-US" smtClean="0"/>
               <a:pPr lvl="0"/>
-              <a:t>11/5/2016</a:t>
+              <a:t>10/1/2017</a:t>
             </a:fld>
             <a:endParaRPr lang="en-US"/>
           </a:p>
@@ -4080,7 +4080,7 @@
             <a:fld id="{5A14DE2F-99D9-4C9A-873C-DD21F3849A08}" type="datetime1">
               <a:rPr lang="en-US" smtClean="0"/>
               <a:pPr lvl="0"/>
-              <a:t>11/5/2016</a:t>
+              <a:t>10/1/2017</a:t>
             </a:fld>
             <a:endParaRPr lang="en-US"/>
           </a:p>
@@ -4209,7 +4209,7 @@
             <a:fld id="{5A14DE2F-99D9-4C9A-873C-DD21F3849A08}" type="datetime1">
               <a:rPr lang="en-US" smtClean="0"/>
               <a:pPr lvl="0"/>
-              <a:t>11/5/2016</a:t>
+              <a:t>10/1/2017</a:t>
             </a:fld>
             <a:endParaRPr lang="en-US"/>
           </a:p>
@@ -4315,7 +4315,7 @@
             <a:fld id="{5A14DE2F-99D9-4C9A-873C-DD21F3849A08}" type="datetime1">
               <a:rPr lang="en-US" smtClean="0"/>
               <a:pPr lvl="0"/>
-              <a:t>11/5/2016</a:t>
+              <a:t>10/1/2017</a:t>
             </a:fld>
             <a:endParaRPr lang="en-US"/>
           </a:p>
@@ -4604,7 +4604,7 @@
             <a:fld id="{5A14DE2F-99D9-4C9A-873C-DD21F3849A08}" type="datetime1">
               <a:rPr lang="en-US" smtClean="0"/>
               <a:pPr lvl="0"/>
-              <a:t>11/5/2016</a:t>
+              <a:t>10/1/2017</a:t>
             </a:fld>
             <a:endParaRPr lang="en-US"/>
           </a:p>
@@ -4785,7 +4785,7 @@
             <a:fld id="{F419F0EB-BCE3-4FC1-8CC7-D5D2DD01CF44}" type="datetime1">
               <a:rPr lang="en-US" smtClean="0"/>
               <a:pPr lvl="0"/>
-              <a:t>11/5/2016</a:t>
+              <a:t>10/1/2017</a:t>
             </a:fld>
             <a:endParaRPr lang="en-US"/>
           </a:p>
@@ -5049,7 +5049,7 @@
             <a:fld id="{5A14DE2F-99D9-4C9A-873C-DD21F3849A08}" type="datetime1">
               <a:rPr lang="en-US" smtClean="0"/>
               <a:pPr lvl="0"/>
-              <a:t>11/5/2016</a:t>
+              <a:t>10/1/2017</a:t>
             </a:fld>
             <a:endParaRPr lang="en-US"/>
           </a:p>
@@ -5230,7 +5230,7 @@
             <a:fld id="{5A14DE2F-99D9-4C9A-873C-DD21F3849A08}" type="datetime1">
               <a:rPr lang="en-US" smtClean="0"/>
               <a:pPr lvl="0"/>
-              <a:t>11/5/2016</a:t>
+              <a:t>10/1/2017</a:t>
             </a:fld>
             <a:endParaRPr lang="en-US"/>
           </a:p>
@@ -5421,7 +5421,7 @@
             <a:fld id="{5A14DE2F-99D9-4C9A-873C-DD21F3849A08}" type="datetime1">
               <a:rPr lang="en-US" smtClean="0"/>
               <a:pPr lvl="0"/>
-              <a:t>11/5/2016</a:t>
+              <a:t>10/1/2017</a:t>
             </a:fld>
             <a:endParaRPr lang="en-US"/>
           </a:p>
@@ -5624,7 +5624,7 @@
             <a:fld id="{BF821649-3BAD-4231-A599-33B65C52BDDB}" type="datetime1">
               <a:rPr lang="en-US" smtClean="0"/>
               <a:pPr lvl="0"/>
-              <a:t>11/5/2016</a:t>
+              <a:t>10/1/2017</a:t>
             </a:fld>
             <a:endParaRPr lang="en-US"/>
           </a:p>
@@ -5805,7 +5805,7 @@
             <a:fld id="{BF821649-3BAD-4231-A599-33B65C52BDDB}" type="datetime1">
               <a:rPr lang="en-US" smtClean="0"/>
               <a:pPr lvl="0"/>
-              <a:t>11/5/2016</a:t>
+              <a:t>10/1/2017</a:t>
             </a:fld>
             <a:endParaRPr lang="en-US"/>
           </a:p>
@@ -6062,7 +6062,7 @@
             <a:fld id="{BF821649-3BAD-4231-A599-33B65C52BDDB}" type="datetime1">
               <a:rPr lang="en-US" smtClean="0"/>
               <a:pPr lvl="0"/>
-              <a:t>11/5/2016</a:t>
+              <a:t>10/1/2017</a:t>
             </a:fld>
             <a:endParaRPr lang="en-US"/>
           </a:p>
@@ -6305,7 +6305,7 @@
             <a:fld id="{BF821649-3BAD-4231-A599-33B65C52BDDB}" type="datetime1">
               <a:rPr lang="en-US" smtClean="0"/>
               <a:pPr lvl="0"/>
-              <a:t>11/5/2016</a:t>
+              <a:t>10/1/2017</a:t>
             </a:fld>
             <a:endParaRPr lang="en-US"/>
           </a:p>
@@ -6683,7 +6683,7 @@
             <a:fld id="{BF821649-3BAD-4231-A599-33B65C52BDDB}" type="datetime1">
               <a:rPr lang="en-US" smtClean="0"/>
               <a:pPr lvl="0"/>
-              <a:t>11/5/2016</a:t>
+              <a:t>10/1/2017</a:t>
             </a:fld>
             <a:endParaRPr lang="en-US"/>
           </a:p>
@@ -6812,7 +6812,7 @@
             <a:fld id="{BF821649-3BAD-4231-A599-33B65C52BDDB}" type="datetime1">
               <a:rPr lang="en-US" smtClean="0"/>
               <a:pPr lvl="0"/>
-              <a:t>11/5/2016</a:t>
+              <a:t>10/1/2017</a:t>
             </a:fld>
             <a:endParaRPr lang="en-US"/>
           </a:p>
@@ -6918,7 +6918,7 @@
             <a:fld id="{BF821649-3BAD-4231-A599-33B65C52BDDB}" type="datetime1">
               <a:rPr lang="en-US" smtClean="0"/>
               <a:pPr lvl="0"/>
-              <a:t>11/5/2016</a:t>
+              <a:t>10/1/2017</a:t>
             </a:fld>
             <a:endParaRPr lang="en-US"/>
           </a:p>
@@ -7176,7 +7176,7 @@
             <a:fld id="{F419F0EB-BCE3-4FC1-8CC7-D5D2DD01CF44}" type="datetime1">
               <a:rPr lang="en-US" smtClean="0"/>
               <a:pPr lvl="0"/>
-              <a:t>11/5/2016</a:t>
+              <a:t>10/1/2017</a:t>
             </a:fld>
             <a:endParaRPr lang="en-US"/>
           </a:p>
@@ -7464,7 +7464,7 @@
             <a:fld id="{BF821649-3BAD-4231-A599-33B65C52BDDB}" type="datetime1">
               <a:rPr lang="en-US" smtClean="0"/>
               <a:pPr lvl="0"/>
-              <a:t>11/5/2016</a:t>
+              <a:t>10/1/2017</a:t>
             </a:fld>
             <a:endParaRPr lang="en-US"/>
           </a:p>
@@ -7728,7 +7728,7 @@
             <a:fld id="{BF821649-3BAD-4231-A599-33B65C52BDDB}" type="datetime1">
               <a:rPr lang="en-US" smtClean="0"/>
               <a:pPr lvl="0"/>
-              <a:t>11/5/2016</a:t>
+              <a:t>10/1/2017</a:t>
             </a:fld>
             <a:endParaRPr lang="en-US"/>
           </a:p>
@@ -7909,7 +7909,7 @@
             <a:fld id="{BF821649-3BAD-4231-A599-33B65C52BDDB}" type="datetime1">
               <a:rPr lang="en-US" smtClean="0"/>
               <a:pPr lvl="0"/>
-              <a:t>11/5/2016</a:t>
+              <a:t>10/1/2017</a:t>
             </a:fld>
             <a:endParaRPr lang="en-US"/>
           </a:p>
@@ -8100,7 +8100,7 @@
             <a:fld id="{BF821649-3BAD-4231-A599-33B65C52BDDB}" type="datetime1">
               <a:rPr lang="en-US" smtClean="0"/>
               <a:pPr lvl="0"/>
-              <a:t>11/5/2016</a:t>
+              <a:t>10/1/2017</a:t>
             </a:fld>
             <a:endParaRPr lang="en-US"/>
           </a:p>
@@ -8303,7 +8303,7 @@
             <a:fld id="{8E62C482-1A6F-434A-9681-F78CBEC1795A}" type="datetime1">
               <a:rPr lang="en-US" smtClean="0"/>
               <a:pPr lvl="0"/>
-              <a:t>11/5/2016</a:t>
+              <a:t>10/1/2017</a:t>
             </a:fld>
             <a:endParaRPr lang="en-US"/>
           </a:p>
@@ -8484,7 +8484,7 @@
             <a:fld id="{8E62C482-1A6F-434A-9681-F78CBEC1795A}" type="datetime1">
               <a:rPr lang="en-US" smtClean="0"/>
               <a:pPr lvl="0"/>
-              <a:t>11/5/2016</a:t>
+              <a:t>10/1/2017</a:t>
             </a:fld>
             <a:endParaRPr lang="en-US"/>
           </a:p>
@@ -8741,7 +8741,7 @@
             <a:fld id="{8E62C482-1A6F-434A-9681-F78CBEC1795A}" type="datetime1">
               <a:rPr lang="en-US" smtClean="0"/>
               <a:pPr lvl="0"/>
-              <a:t>11/5/2016</a:t>
+              <a:t>10/1/2017</a:t>
             </a:fld>
             <a:endParaRPr lang="en-US"/>
           </a:p>
@@ -8984,7 +8984,7 @@
             <a:fld id="{8E62C482-1A6F-434A-9681-F78CBEC1795A}" type="datetime1">
               <a:rPr lang="en-US" smtClean="0"/>
               <a:pPr lvl="0"/>
-              <a:t>11/5/2016</a:t>
+              <a:t>10/1/2017</a:t>
             </a:fld>
             <a:endParaRPr lang="en-US"/>
           </a:p>
@@ -9362,7 +9362,7 @@
             <a:fld id="{8E62C482-1A6F-434A-9681-F78CBEC1795A}" type="datetime1">
               <a:rPr lang="en-US" smtClean="0"/>
               <a:pPr lvl="0"/>
-              <a:t>11/5/2016</a:t>
+              <a:t>10/1/2017</a:t>
             </a:fld>
             <a:endParaRPr lang="en-US"/>
           </a:p>
@@ -9491,7 +9491,7 @@
             <a:fld id="{8E62C482-1A6F-434A-9681-F78CBEC1795A}" type="datetime1">
               <a:rPr lang="en-US" smtClean="0"/>
               <a:pPr lvl="0"/>
-              <a:t>11/5/2016</a:t>
+              <a:t>10/1/2017</a:t>
             </a:fld>
             <a:endParaRPr lang="en-US"/>
           </a:p>
@@ -9734,7 +9734,7 @@
             <a:fld id="{F419F0EB-BCE3-4FC1-8CC7-D5D2DD01CF44}" type="datetime1">
               <a:rPr lang="en-US" smtClean="0"/>
               <a:pPr lvl="0"/>
-              <a:t>11/5/2016</a:t>
+              <a:t>10/1/2017</a:t>
             </a:fld>
             <a:endParaRPr lang="en-US"/>
           </a:p>
@@ -9851,7 +9851,7 @@
             <a:fld id="{8E62C482-1A6F-434A-9681-F78CBEC1795A}" type="datetime1">
               <a:rPr lang="en-US" smtClean="0"/>
               <a:pPr lvl="0"/>
-              <a:t>11/5/2016</a:t>
+              <a:t>10/1/2017</a:t>
             </a:fld>
             <a:endParaRPr lang="en-US"/>
           </a:p>
@@ -10140,7 +10140,7 @@
             <a:fld id="{8E62C482-1A6F-434A-9681-F78CBEC1795A}" type="datetime1">
               <a:rPr lang="en-US" smtClean="0"/>
               <a:pPr lvl="0"/>
-              <a:t>11/5/2016</a:t>
+              <a:t>10/1/2017</a:t>
             </a:fld>
             <a:endParaRPr lang="en-US"/>
           </a:p>
@@ -10404,7 +10404,7 @@
             <a:fld id="{8E62C482-1A6F-434A-9681-F78CBEC1795A}" type="datetime1">
               <a:rPr lang="en-US" smtClean="0"/>
               <a:pPr lvl="0"/>
-              <a:t>11/5/2016</a:t>
+              <a:t>10/1/2017</a:t>
             </a:fld>
             <a:endParaRPr lang="en-US"/>
           </a:p>
@@ -10585,7 +10585,7 @@
             <a:fld id="{8E62C482-1A6F-434A-9681-F78CBEC1795A}" type="datetime1">
               <a:rPr lang="en-US" smtClean="0"/>
               <a:pPr lvl="0"/>
-              <a:t>11/5/2016</a:t>
+              <a:t>10/1/2017</a:t>
             </a:fld>
             <a:endParaRPr lang="en-US"/>
           </a:p>
@@ -10776,7 +10776,7 @@
             <a:fld id="{8E62C482-1A6F-434A-9681-F78CBEC1795A}" type="datetime1">
               <a:rPr lang="en-US" smtClean="0"/>
               <a:pPr lvl="0"/>
-              <a:t>11/5/2016</a:t>
+              <a:t>10/1/2017</a:t>
             </a:fld>
             <a:endParaRPr lang="en-US"/>
           </a:p>
@@ -11154,7 +11154,7 @@
             <a:fld id="{F419F0EB-BCE3-4FC1-8CC7-D5D2DD01CF44}" type="datetime1">
               <a:rPr lang="en-US" smtClean="0"/>
               <a:pPr lvl="0"/>
-              <a:t>11/5/2016</a:t>
+              <a:t>10/1/2017</a:t>
             </a:fld>
             <a:endParaRPr lang="en-US"/>
           </a:p>
@@ -11283,7 +11283,7 @@
             <a:fld id="{F419F0EB-BCE3-4FC1-8CC7-D5D2DD01CF44}" type="datetime1">
               <a:rPr lang="en-US" smtClean="0"/>
               <a:pPr lvl="0"/>
-              <a:t>11/5/2016</a:t>
+              <a:t>10/1/2017</a:t>
             </a:fld>
             <a:endParaRPr lang="en-US"/>
           </a:p>
@@ -11389,7 +11389,7 @@
             <a:fld id="{F419F0EB-BCE3-4FC1-8CC7-D5D2DD01CF44}" type="datetime1">
               <a:rPr lang="en-US" smtClean="0"/>
               <a:pPr lvl="0"/>
-              <a:t>11/5/2016</a:t>
+              <a:t>10/1/2017</a:t>
             </a:fld>
             <a:endParaRPr lang="en-US"/>
           </a:p>
@@ -11678,7 +11678,7 @@
             <a:fld id="{F419F0EB-BCE3-4FC1-8CC7-D5D2DD01CF44}" type="datetime1">
               <a:rPr lang="en-US" smtClean="0"/>
               <a:pPr lvl="0"/>
-              <a:t>11/5/2016</a:t>
+              <a:t>10/1/2017</a:t>
             </a:fld>
             <a:endParaRPr lang="en-US"/>
           </a:p>
@@ -11942,7 +11942,7 @@
             <a:fld id="{F419F0EB-BCE3-4FC1-8CC7-D5D2DD01CF44}" type="datetime1">
               <a:rPr lang="en-US" smtClean="0"/>
               <a:pPr lvl="0"/>
-              <a:t>11/5/2016</a:t>
+              <a:t>10/1/2017</a:t>
             </a:fld>
             <a:endParaRPr lang="en-US"/>
           </a:p>
@@ -12883,7 +12883,7 @@
             <a:fld id="{F419F0EB-BCE3-4FC1-8CC7-D5D2DD01CF44}" type="datetime1">
               <a:rPr lang="en-US"/>
               <a:pPr lvl="0"/>
-              <a:t>11/5/2016</a:t>
+              <a:t>10/1/2017</a:t>
             </a:fld>
             <a:endParaRPr lang="en-US"/>
           </a:p>
@@ -13891,7 +13891,7 @@
             <a:fld id="{5A14DE2F-99D9-4C9A-873C-DD21F3849A08}" type="datetime1">
               <a:rPr lang="en-US"/>
               <a:pPr lvl="0"/>
-              <a:t>11/5/2016</a:t>
+              <a:t>10/1/2017</a:t>
             </a:fld>
             <a:endParaRPr lang="en-US"/>
           </a:p>
@@ -15052,7 +15052,7 @@
             <a:fld id="{BF821649-3BAD-4231-A599-33B65C52BDDB}" type="datetime1">
               <a:rPr lang="en-US"/>
               <a:pPr lvl="0"/>
-              <a:t>11/5/2016</a:t>
+              <a:t>10/1/2017</a:t>
             </a:fld>
             <a:endParaRPr lang="en-US"/>
           </a:p>
@@ -15941,7 +15941,7 @@
             <a:fld id="{8E62C482-1A6F-434A-9681-F78CBEC1795A}" type="datetime1">
               <a:rPr lang="en-US"/>
               <a:pPr lvl="0"/>
-              <a:t>11/5/2016</a:t>
+              <a:t>10/1/2017</a:t>
             </a:fld>
             <a:endParaRPr lang="en-US"/>
           </a:p>
@@ -16827,32 +16827,12 @@
               <a:defRPr sz="1800"/>
             </a:pPr>
             <a:r>
-              <a:rPr lang="en-US" sz="2400" b="0" i="0" u="none" strike="noStrike" kern="1200" spc="0" dirty="0">
-                <a:ln>
-                  <a:noFill/>
-                </a:ln>
+              <a:rPr lang="en-US" sz="2400" dirty="0" smtClean="0">
                 <a:latin typeface="Calibri" pitchFamily="18"/>
                 <a:ea typeface="Microsoft YaHei" pitchFamily="2"/>
                 <a:cs typeface="Mangal" pitchFamily="2"/>
               </a:rPr>
-              <a:t>Minimize connections between classes.   </a:t>
-            </a:r>
-          </a:p>
-          <a:p>
-            <a:pPr marL="914400" lvl="3">
-              <a:buSzPct val="45000"/>
-              <a:defRPr sz="1800"/>
-            </a:pPr>
-            <a:r>
-              <a:rPr lang="en-US" sz="2400" b="0" i="0" u="none" strike="noStrike" kern="1200" spc="0" dirty="0">
-                <a:ln>
-                  <a:noFill/>
-                </a:ln>
-                <a:latin typeface="Calibri" pitchFamily="18"/>
-                <a:ea typeface="Microsoft YaHei" pitchFamily="2"/>
-                <a:cs typeface="Mangal" pitchFamily="2"/>
-              </a:rPr>
-              <a:t>The class knows all about manipulating its data and keeps it private, while exposing only high level functions for use elsewhere. </a:t>
+              <a:t>Minimize interconnection between classes</a:t>
             </a:r>
             <a:r>
               <a:rPr lang="en-US" sz="2400" b="0" i="0" u="none" strike="noStrike" kern="1200" spc="0" dirty="0" smtClean="0">
@@ -16863,10 +16843,16 @@
                 <a:ea typeface="Microsoft YaHei" pitchFamily="2"/>
                 <a:cs typeface="Mangal" pitchFamily="2"/>
               </a:rPr>
-              <a:t>  This makes it less </a:t>
-            </a:r>
-            <a:r>
-              <a:rPr lang="en-US" sz="2400" b="0" i="0" u="none" strike="noStrike" kern="1200" spc="0" dirty="0">
+              <a:t>   </a:t>
+            </a:r>
+          </a:p>
+          <a:p>
+            <a:pPr marL="914400" lvl="3">
+              <a:buSzPct val="45000"/>
+              <a:defRPr sz="1800"/>
+            </a:pPr>
+            <a:r>
+              <a:rPr lang="en-US" sz="2400" b="0" i="0" u="none" strike="noStrike" kern="1200" spc="0" dirty="0" smtClean="0">
                 <a:ln>
                   <a:noFill/>
                 </a:ln>
@@ -16874,8 +16860,16 @@
                 <a:ea typeface="Microsoft YaHei" pitchFamily="2"/>
                 <a:cs typeface="Mangal" pitchFamily="2"/>
               </a:rPr>
-              <a:t>likely that any one person needs to change a lot of files at once.</a:t>
-            </a:r>
+              <a:t>Each class knows all about manipulating its data and keeps it private, while exposing only high level functions for use elsewhere.   This makes it less likely that any one person needs to change a lot of files at once.</a:t>
+            </a:r>
+            <a:endParaRPr lang="en-US" sz="2400" b="0" i="0" u="none" strike="noStrike" kern="1200" spc="0" dirty="0">
+              <a:ln>
+                <a:noFill/>
+              </a:ln>
+              <a:latin typeface="Calibri" pitchFamily="18"/>
+              <a:ea typeface="Microsoft YaHei" pitchFamily="2"/>
+              <a:cs typeface="Mangal" pitchFamily="2"/>
+            </a:endParaRPr>
           </a:p>
         </p:txBody>
       </p:sp>
@@ -18316,25 +18310,11 @@
             </a:r>
           </a:p>
           <a:p>
-            <a:pPr marL="1218960" marR="0" lvl="0" indent="0" algn="l" rtl="0" hangingPunct="1">
-              <a:lnSpc>
-                <a:spcPct val="100000"/>
-              </a:lnSpc>
-              <a:spcBef>
-                <a:spcPts val="0"/>
-              </a:spcBef>
-              <a:spcAft>
-                <a:spcPts val="0"/>
-              </a:spcAft>
-              <a:buNone/>
-              <a:tabLst/>
+            <a:pPr marL="1218960" lvl="0">
               <a:defRPr sz="1800"/>
             </a:pPr>
             <a:r>
-              <a:rPr lang="en-US" sz="2400" b="0" i="0" u="none" strike="noStrike" kern="1200" spc="0" dirty="0">
-                <a:ln>
-                  <a:noFill/>
-                </a:ln>
+              <a:rPr lang="en-US" sz="2400" dirty="0">
                 <a:solidFill>
                   <a:srgbClr val="FFFFFF"/>
                 </a:solidFill>
@@ -18343,22 +18323,34 @@
                 <a:cs typeface="Mangal" pitchFamily="2"/>
                 <a:hlinkClick r:id="rId3"/>
               </a:rPr>
-              <a:t>https://github.com/Team4276/GitTest</a:t>
-            </a:r>
-          </a:p>
-          <a:p>
-            <a:pPr marL="1218960" marR="0" lvl="0" indent="0" algn="l" rtl="0" hangingPunct="1">
-              <a:lnSpc>
-                <a:spcPct val="100000"/>
-              </a:lnSpc>
-              <a:spcBef>
-                <a:spcPts val="0"/>
-              </a:spcBef>
-              <a:spcAft>
-                <a:spcPts val="0"/>
-              </a:spcAft>
-              <a:buNone/>
-              <a:tabLst/>
+              <a:t>https://</a:t>
+            </a:r>
+            <a:r>
+              <a:rPr lang="en-US" sz="2400" dirty="0" smtClean="0">
+                <a:solidFill>
+                  <a:srgbClr val="FFFFFF"/>
+                </a:solidFill>
+                <a:latin typeface="Calibri" pitchFamily="18"/>
+                <a:ea typeface="Microsoft YaHei" pitchFamily="2"/>
+                <a:cs typeface="Mangal" pitchFamily="2"/>
+                <a:hlinkClick r:id="rId3"/>
+              </a:rPr>
+              <a:t>github.com/FRC4913/GitTest</a:t>
+            </a:r>
+            <a:r>
+              <a:rPr lang="en-US" sz="2400" dirty="0" smtClean="0">
+                <a:solidFill>
+                  <a:srgbClr val="FFFFFF"/>
+                </a:solidFill>
+                <a:latin typeface="Calibri" pitchFamily="18"/>
+                <a:ea typeface="Microsoft YaHei" pitchFamily="2"/>
+                <a:cs typeface="Mangal" pitchFamily="2"/>
+              </a:rPr>
+              <a:t> </a:t>
+            </a:r>
+          </a:p>
+          <a:p>
+            <a:pPr marL="1218960" lvl="0">
               <a:defRPr sz="1800"/>
             </a:pPr>
             <a:endParaRPr lang="en-US" sz="2400" b="0" i="0" u="none" strike="noStrike" kern="1200" spc="0" dirty="0">
@@ -19980,8 +19972,27 @@
                 <a:ea typeface="Microsoft YaHei" pitchFamily="2"/>
                 <a:cs typeface="Mangal" pitchFamily="2"/>
               </a:rPr>
-              <a:t>This address needs to be in the GitHub member group “2017 Programmers”</a:t>
-            </a:r>
+              <a:t>This address needs to be in the GitHub member group </a:t>
+            </a:r>
+            <a:r>
+              <a:rPr lang="en-US" sz="2400" b="0" i="0" u="none" strike="noStrike" kern="1200" spc="0" dirty="0" smtClean="0">
+                <a:ln>
+                  <a:noFill/>
+                </a:ln>
+                <a:latin typeface="Calibri" pitchFamily="18"/>
+                <a:ea typeface="Microsoft YaHei" pitchFamily="2"/>
+                <a:cs typeface="Mangal" pitchFamily="2"/>
+              </a:rPr>
+              <a:t>“anonymous”</a:t>
+            </a:r>
+            <a:endParaRPr lang="en-US" sz="2400" b="0" i="0" u="none" strike="noStrike" kern="1200" spc="0" dirty="0">
+              <a:ln>
+                <a:noFill/>
+              </a:ln>
+              <a:latin typeface="Calibri" pitchFamily="18"/>
+              <a:ea typeface="Microsoft YaHei" pitchFamily="2"/>
+              <a:cs typeface="Mangal" pitchFamily="2"/>
+            </a:endParaRPr>
           </a:p>
           <a:p>
             <a:pPr marL="952380" marR="0" lvl="0" indent="-342900" algn="l" rtl="0" hangingPunct="1">

</xml_diff>